<commit_message>
law page crawling and searching through title for lawe page, all rounder main function for that
</commit_message>
<xml_diff>
--- a/CrowdPresentationTheBest.pptx
+++ b/CrowdPresentationTheBest.pptx
@@ -115,6 +115,22 @@
       </a:defRPr>
     </a:lvl9pPr>
   </p:defaultTextStyle>
+  <p:extLst>
+    <p:ext uri="{EFAFB233-063F-42B5-8137-9DF3F51BA10A}">
+      <p15:sldGuideLst xmlns:p15="http://schemas.microsoft.com/office/powerpoint/2012/main">
+        <p15:guide id="1" orient="horz" pos="2160">
+          <p15:clr>
+            <a:srgbClr val="A4A3A4"/>
+          </p15:clr>
+        </p15:guide>
+        <p15:guide id="2" pos="2880">
+          <p15:clr>
+            <a:srgbClr val="A4A3A4"/>
+          </p15:clr>
+        </p15:guide>
+      </p15:sldGuideLst>
+    </p:ext>
+  </p:extLst>
 </p:presentation>
 </file>
 
@@ -743,7 +759,7 @@
           <a:p>
             <a:fld id="{4E7438E1-117D-44FB-AC24-B79D899BA877}" type="datetimeFigureOut">
               <a:rPr lang="he-IL" smtClean="0"/>
-              <a:t>כ"ב/כסלו/תשע"ח</a:t>
+              <a:t>כ"ה/כסלו/תשע"ח</a:t>
             </a:fld>
             <a:endParaRPr lang="he-IL"/>
           </a:p>
@@ -939,7 +955,7 @@
           <a:p>
             <a:fld id="{4E7438E1-117D-44FB-AC24-B79D899BA877}" type="datetimeFigureOut">
               <a:rPr lang="he-IL" smtClean="0"/>
-              <a:t>כ"ב/כסלו/תשע"ח</a:t>
+              <a:t>כ"ה/כסלו/תשע"ח</a:t>
             </a:fld>
             <a:endParaRPr lang="he-IL"/>
           </a:p>
@@ -1124,7 +1140,7 @@
           <a:p>
             <a:fld id="{4E7438E1-117D-44FB-AC24-B79D899BA877}" type="datetimeFigureOut">
               <a:rPr lang="he-IL" smtClean="0"/>
-              <a:t>כ"ב/כסלו/תשע"ח</a:t>
+              <a:t>כ"ה/כסלו/תשע"ח</a:t>
             </a:fld>
             <a:endParaRPr lang="he-IL"/>
           </a:p>
@@ -1274,7 +1290,7 @@
           <a:p>
             <a:fld id="{4E7438E1-117D-44FB-AC24-B79D899BA877}" type="datetimeFigureOut">
               <a:rPr lang="he-IL" smtClean="0"/>
-              <a:t>כ"ב/כסלו/תשע"ח</a:t>
+              <a:t>כ"ה/כסלו/תשע"ח</a:t>
             </a:fld>
             <a:endParaRPr lang="he-IL"/>
           </a:p>
@@ -1529,7 +1545,7 @@
           <a:p>
             <a:fld id="{4E7438E1-117D-44FB-AC24-B79D899BA877}" type="datetimeFigureOut">
               <a:rPr lang="he-IL" smtClean="0"/>
-              <a:t>כ"ב/כסלו/תשע"ח</a:t>
+              <a:t>כ"ה/כסלו/תשע"ח</a:t>
             </a:fld>
             <a:endParaRPr lang="he-IL"/>
           </a:p>
@@ -1938,7 +1954,7 @@
           <a:p>
             <a:fld id="{4E7438E1-117D-44FB-AC24-B79D899BA877}" type="datetimeFigureOut">
               <a:rPr lang="he-IL" smtClean="0"/>
-              <a:t>כ"ב/כסלו/תשע"ח</a:t>
+              <a:t>כ"ה/כסלו/תשע"ח</a:t>
             </a:fld>
             <a:endParaRPr lang="he-IL"/>
           </a:p>
@@ -2384,7 +2400,7 @@
           <a:p>
             <a:fld id="{4E7438E1-117D-44FB-AC24-B79D899BA877}" type="datetimeFigureOut">
               <a:rPr lang="he-IL" smtClean="0"/>
-              <a:t>כ"ב/כסלו/תשע"ח</a:t>
+              <a:t>כ"ה/כסלו/תשע"ח</a:t>
             </a:fld>
             <a:endParaRPr lang="he-IL"/>
           </a:p>
@@ -2485,7 +2501,7 @@
           <a:p>
             <a:fld id="{4E7438E1-117D-44FB-AC24-B79D899BA877}" type="datetimeFigureOut">
               <a:rPr lang="he-IL" smtClean="0"/>
-              <a:t>כ"ב/כסלו/תשע"ח</a:t>
+              <a:t>כ"ה/כסלו/תשע"ח</a:t>
             </a:fld>
             <a:endParaRPr lang="he-IL"/>
           </a:p>
@@ -2606,7 +2622,7 @@
           <a:p>
             <a:fld id="{4E7438E1-117D-44FB-AC24-B79D899BA877}" type="datetimeFigureOut">
               <a:rPr lang="he-IL" smtClean="0"/>
-              <a:t>כ"ב/כסלו/תשע"ח</a:t>
+              <a:t>כ"ה/כסלו/תשע"ח</a:t>
             </a:fld>
             <a:endParaRPr lang="he-IL"/>
           </a:p>
@@ -2880,7 +2896,7 @@
           <a:p>
             <a:fld id="{4E7438E1-117D-44FB-AC24-B79D899BA877}" type="datetimeFigureOut">
               <a:rPr lang="he-IL" smtClean="0"/>
-              <a:t>כ"ב/כסלו/תשע"ח</a:t>
+              <a:t>כ"ה/כסלו/תשע"ח</a:t>
             </a:fld>
             <a:endParaRPr lang="he-IL"/>
           </a:p>
@@ -3085,7 +3101,7 @@
           <a:p>
             <a:fld id="{4E7438E1-117D-44FB-AC24-B79D899BA877}" type="datetimeFigureOut">
               <a:rPr lang="he-IL" smtClean="0"/>
-              <a:t>כ"ב/כסלו/תשע"ח</a:t>
+              <a:t>כ"ה/כסלו/תשע"ח</a:t>
             </a:fld>
             <a:endParaRPr lang="he-IL"/>
           </a:p>
@@ -4194,7 +4210,7 @@
           <a:p>
             <a:fld id="{4E7438E1-117D-44FB-AC24-B79D899BA877}" type="datetimeFigureOut">
               <a:rPr lang="he-IL" smtClean="0"/>
-              <a:t>כ"ב/כסלו/תשע"ח</a:t>
+              <a:t>כ"ה/כסלו/תשע"ח</a:t>
             </a:fld>
             <a:endParaRPr lang="he-IL"/>
           </a:p>
@@ -8104,19 +8120,25 @@
               <a:rPr lang="en-US" sz="1800" dirty="0" smtClean="0">
                 <a:latin typeface="Trebuchet MS" pitchFamily="34" charset="0"/>
               </a:rPr>
-              <a:t>The </a:t>
+              <a:t>The public </a:t>
+            </a:r>
+            <a:r>
+              <a:rPr lang="en-US" sz="1800" dirty="0" smtClean="0">
+                <a:latin typeface="Trebuchet MS" pitchFamily="34" charset="0"/>
+              </a:rPr>
+              <a:t>engagement’s </a:t>
             </a:r>
             <a:r>
               <a:rPr lang="en-US" sz="1800" dirty="0">
                 <a:latin typeface="Trebuchet MS" pitchFamily="34" charset="0"/>
               </a:rPr>
-              <a:t>average of public engagement is standing on 2.4 (on a scale 0 to 4</a:t>
+              <a:t>average </a:t>
             </a:r>
             <a:r>
               <a:rPr lang="en-US" sz="1800" dirty="0" smtClean="0">
                 <a:latin typeface="Trebuchet MS" pitchFamily="34" charset="0"/>
               </a:rPr>
-              <a:t>).</a:t>
+              <a:t>is standing on 2.4 (on a scale 0 to 4).</a:t>
             </a:r>
           </a:p>
           <a:p>
@@ -8131,7 +8153,7 @@
               <a:rPr lang="en-US" sz="1800" dirty="0" smtClean="0">
                 <a:latin typeface="Trebuchet MS" pitchFamily="34" charset="0"/>
               </a:rPr>
-              <a:t>Israel </a:t>
+              <a:t>Israel’s </a:t>
             </a:r>
             <a:r>
               <a:rPr lang="en-US" sz="1800" dirty="0">
@@ -8925,271 +8947,43 @@
               <a:rPr lang="he-IL" altLang="he-IL" sz="2000" dirty="0">
                 <a:latin typeface="Trebuchet MS" pitchFamily="34" charset="0"/>
               </a:rPr>
-              <a:t>. </a:t>
-            </a:r>
-            <a:r>
-              <a:rPr lang="he-IL" altLang="he-IL" sz="2000" dirty="0" err="1">
-                <a:latin typeface="Trebuchet MS" pitchFamily="34" charset="0"/>
-              </a:rPr>
-              <a:t>Considering</a:t>
+              <a:t>. Considering that half a million of those registered </a:t>
+            </a:r>
+            <a:r>
+              <a:rPr lang="he-IL" altLang="he-IL" sz="2000" dirty="0" smtClean="0">
+                <a:latin typeface="Trebuchet MS" pitchFamily="34" charset="0"/>
+              </a:rPr>
+              <a:t>in </a:t>
             </a:r>
             <a:r>
               <a:rPr lang="he-IL" altLang="he-IL" sz="2000" dirty="0">
                 <a:latin typeface="Trebuchet MS" pitchFamily="34" charset="0"/>
               </a:rPr>
+              <a:t>the voter </a:t>
+            </a:r>
+            <a:r>
+              <a:rPr lang="he-IL" altLang="he-IL" sz="2000" dirty="0" smtClean="0">
+                <a:latin typeface="Trebuchet MS" pitchFamily="34" charset="0"/>
+              </a:rPr>
+              <a:t>register</a:t>
+            </a:r>
+            <a:r>
+              <a:rPr lang="en-US" altLang="he-IL" sz="2000" dirty="0" smtClean="0">
+                <a:latin typeface="Trebuchet MS" pitchFamily="34" charset="0"/>
+              </a:rPr>
+              <a:t>y</a:t>
+            </a:r>
+            <a:r>
+              <a:rPr lang="he-IL" altLang="he-IL" sz="2000" dirty="0" smtClean="0">
+                <a:latin typeface="Trebuchet MS" pitchFamily="34" charset="0"/>
+              </a:rPr>
               <a:t> </a:t>
             </a:r>
             <a:r>
-              <a:rPr lang="he-IL" altLang="he-IL" sz="2000" dirty="0" err="1">
-                <a:latin typeface="Trebuchet MS" pitchFamily="34" charset="0"/>
-              </a:rPr>
-              <a:t>that</a:t>
-            </a:r>
-            <a:r>
               <a:rPr lang="he-IL" altLang="he-IL" sz="2000" dirty="0">
                 <a:latin typeface="Trebuchet MS" pitchFamily="34" charset="0"/>
               </a:rPr>
-              <a:t> </a:t>
-            </a:r>
-            <a:r>
-              <a:rPr lang="he-IL" altLang="he-IL" sz="2000" dirty="0" err="1">
-                <a:latin typeface="Trebuchet MS" pitchFamily="34" charset="0"/>
-              </a:rPr>
-              <a:t>half</a:t>
-            </a:r>
-            <a:r>
-              <a:rPr lang="he-IL" altLang="he-IL" sz="2000" dirty="0">
-                <a:latin typeface="Trebuchet MS" pitchFamily="34" charset="0"/>
-              </a:rPr>
-              <a:t> a </a:t>
-            </a:r>
-            <a:r>
-              <a:rPr lang="he-IL" altLang="he-IL" sz="2000" dirty="0" err="1">
-                <a:latin typeface="Trebuchet MS" pitchFamily="34" charset="0"/>
-              </a:rPr>
-              <a:t>million</a:t>
-            </a:r>
-            <a:r>
-              <a:rPr lang="he-IL" altLang="he-IL" sz="2000" dirty="0">
-                <a:latin typeface="Trebuchet MS" pitchFamily="34" charset="0"/>
-              </a:rPr>
-              <a:t> </a:t>
-            </a:r>
-            <a:r>
-              <a:rPr lang="he-IL" altLang="he-IL" sz="2000" dirty="0" err="1">
-                <a:latin typeface="Trebuchet MS" pitchFamily="34" charset="0"/>
-              </a:rPr>
-              <a:t>of</a:t>
-            </a:r>
-            <a:r>
-              <a:rPr lang="he-IL" altLang="he-IL" sz="2000" dirty="0">
-                <a:latin typeface="Trebuchet MS" pitchFamily="34" charset="0"/>
-              </a:rPr>
-              <a:t> </a:t>
-            </a:r>
-            <a:r>
-              <a:rPr lang="he-IL" altLang="he-IL" sz="2000" dirty="0" err="1">
-                <a:latin typeface="Trebuchet MS" pitchFamily="34" charset="0"/>
-              </a:rPr>
-              <a:t>those</a:t>
-            </a:r>
-            <a:r>
-              <a:rPr lang="he-IL" altLang="he-IL" sz="2000" dirty="0">
-                <a:latin typeface="Trebuchet MS" pitchFamily="34" charset="0"/>
-              </a:rPr>
-              <a:t> </a:t>
-            </a:r>
-            <a:r>
-              <a:rPr lang="he-IL" altLang="he-IL" sz="2000" dirty="0" err="1">
-                <a:latin typeface="Trebuchet MS" pitchFamily="34" charset="0"/>
-              </a:rPr>
-              <a:t>registered</a:t>
-            </a:r>
-            <a:r>
-              <a:rPr lang="he-IL" altLang="he-IL" sz="2000" dirty="0">
-                <a:latin typeface="Trebuchet MS" pitchFamily="34" charset="0"/>
-              </a:rPr>
-              <a:t> </a:t>
-            </a:r>
-            <a:r>
-              <a:rPr lang="he-IL" altLang="he-IL" sz="2000" dirty="0" err="1" smtClean="0">
-                <a:latin typeface="Trebuchet MS" pitchFamily="34" charset="0"/>
-              </a:rPr>
-              <a:t>in</a:t>
-            </a:r>
-            <a:r>
-              <a:rPr lang="he-IL" altLang="he-IL" sz="2000" dirty="0" smtClean="0">
-                <a:latin typeface="Trebuchet MS" pitchFamily="34" charset="0"/>
-              </a:rPr>
-              <a:t> </a:t>
-            </a:r>
-            <a:r>
-              <a:rPr lang="he-IL" altLang="he-IL" sz="2000" dirty="0" err="1">
-                <a:latin typeface="Trebuchet MS" pitchFamily="34" charset="0"/>
-              </a:rPr>
-              <a:t>the</a:t>
-            </a:r>
-            <a:r>
-              <a:rPr lang="he-IL" altLang="he-IL" sz="2000" dirty="0">
-                <a:latin typeface="Trebuchet MS" pitchFamily="34" charset="0"/>
-              </a:rPr>
-              <a:t> </a:t>
-            </a:r>
-            <a:r>
-              <a:rPr lang="he-IL" altLang="he-IL" sz="2000" dirty="0" err="1">
-                <a:latin typeface="Trebuchet MS" pitchFamily="34" charset="0"/>
-              </a:rPr>
-              <a:t>voter</a:t>
-            </a:r>
-            <a:r>
-              <a:rPr lang="he-IL" altLang="he-IL" sz="2000" dirty="0">
-                <a:latin typeface="Trebuchet MS" pitchFamily="34" charset="0"/>
-              </a:rPr>
-              <a:t> </a:t>
-            </a:r>
-            <a:r>
-              <a:rPr lang="he-IL" altLang="he-IL" sz="2000" dirty="0" err="1">
-                <a:latin typeface="Trebuchet MS" pitchFamily="34" charset="0"/>
-              </a:rPr>
-              <a:t>register</a:t>
-            </a:r>
-            <a:r>
-              <a:rPr lang="he-IL" altLang="he-IL" sz="2000" dirty="0">
-                <a:latin typeface="Trebuchet MS" pitchFamily="34" charset="0"/>
-              </a:rPr>
-              <a:t> </a:t>
-            </a:r>
-            <a:r>
-              <a:rPr lang="he-IL" altLang="he-IL" sz="2000" dirty="0" err="1">
-                <a:latin typeface="Trebuchet MS" pitchFamily="34" charset="0"/>
-              </a:rPr>
-              <a:t>do</a:t>
-            </a:r>
-            <a:r>
-              <a:rPr lang="he-IL" altLang="he-IL" sz="2000" dirty="0">
-                <a:latin typeface="Trebuchet MS" pitchFamily="34" charset="0"/>
-              </a:rPr>
-              <a:t> </a:t>
-            </a:r>
-            <a:r>
-              <a:rPr lang="he-IL" altLang="he-IL" sz="2000" dirty="0" err="1">
-                <a:latin typeface="Trebuchet MS" pitchFamily="34" charset="0"/>
-              </a:rPr>
-              <a:t>not</a:t>
-            </a:r>
-            <a:r>
-              <a:rPr lang="he-IL" altLang="he-IL" sz="2000" dirty="0">
-                <a:latin typeface="Trebuchet MS" pitchFamily="34" charset="0"/>
-              </a:rPr>
-              <a:t> </a:t>
-            </a:r>
-            <a:r>
-              <a:rPr lang="he-IL" altLang="he-IL" sz="2000" dirty="0" err="1">
-                <a:latin typeface="Trebuchet MS" pitchFamily="34" charset="0"/>
-              </a:rPr>
-              <a:t>live</a:t>
-            </a:r>
-            <a:r>
-              <a:rPr lang="he-IL" altLang="he-IL" sz="2000" dirty="0">
-                <a:latin typeface="Trebuchet MS" pitchFamily="34" charset="0"/>
-              </a:rPr>
-              <a:t> </a:t>
-            </a:r>
-            <a:r>
-              <a:rPr lang="he-IL" altLang="he-IL" sz="2000" dirty="0" err="1">
-                <a:latin typeface="Trebuchet MS" pitchFamily="34" charset="0"/>
-              </a:rPr>
-              <a:t>in</a:t>
-            </a:r>
-            <a:r>
-              <a:rPr lang="he-IL" altLang="he-IL" sz="2000" dirty="0">
-                <a:latin typeface="Trebuchet MS" pitchFamily="34" charset="0"/>
-              </a:rPr>
-              <a:t> </a:t>
-            </a:r>
-            <a:r>
-              <a:rPr lang="he-IL" altLang="he-IL" sz="2000" dirty="0" err="1">
-                <a:latin typeface="Trebuchet MS" pitchFamily="34" charset="0"/>
-              </a:rPr>
-              <a:t>Israel</a:t>
-            </a:r>
-            <a:r>
-              <a:rPr lang="he-IL" altLang="he-IL" sz="2000" dirty="0">
-                <a:latin typeface="Trebuchet MS" pitchFamily="34" charset="0"/>
-              </a:rPr>
-              <a:t>, </a:t>
-            </a:r>
-            <a:r>
-              <a:rPr lang="he-IL" altLang="he-IL" sz="2000" dirty="0" err="1">
-                <a:latin typeface="Trebuchet MS" pitchFamily="34" charset="0"/>
-              </a:rPr>
-              <a:t>the</a:t>
-            </a:r>
-            <a:r>
-              <a:rPr lang="he-IL" altLang="he-IL" sz="2000" dirty="0">
-                <a:latin typeface="Trebuchet MS" pitchFamily="34" charset="0"/>
-              </a:rPr>
-              <a:t> </a:t>
-            </a:r>
-            <a:r>
-              <a:rPr lang="he-IL" altLang="he-IL" sz="2000" dirty="0" err="1">
-                <a:latin typeface="Trebuchet MS" pitchFamily="34" charset="0"/>
-              </a:rPr>
-              <a:t>actual</a:t>
-            </a:r>
-            <a:r>
-              <a:rPr lang="he-IL" altLang="he-IL" sz="2000" dirty="0">
-                <a:latin typeface="Trebuchet MS" pitchFamily="34" charset="0"/>
-              </a:rPr>
-              <a:t> </a:t>
-            </a:r>
-            <a:r>
-              <a:rPr lang="he-IL" altLang="he-IL" sz="2000" dirty="0" err="1">
-                <a:latin typeface="Trebuchet MS" pitchFamily="34" charset="0"/>
-              </a:rPr>
-              <a:t>voter</a:t>
-            </a:r>
-            <a:r>
-              <a:rPr lang="he-IL" altLang="he-IL" sz="2000" dirty="0">
-                <a:latin typeface="Trebuchet MS" pitchFamily="34" charset="0"/>
-              </a:rPr>
-              <a:t> </a:t>
-            </a:r>
-            <a:r>
-              <a:rPr lang="he-IL" altLang="he-IL" sz="2000" dirty="0" err="1">
-                <a:latin typeface="Trebuchet MS" pitchFamily="34" charset="0"/>
-              </a:rPr>
-              <a:t>turnout</a:t>
-            </a:r>
-            <a:r>
-              <a:rPr lang="he-IL" altLang="he-IL" sz="2000" dirty="0">
-                <a:latin typeface="Trebuchet MS" pitchFamily="34" charset="0"/>
-              </a:rPr>
-              <a:t> </a:t>
-            </a:r>
-            <a:r>
-              <a:rPr lang="he-IL" altLang="he-IL" sz="2000" dirty="0" err="1">
-                <a:latin typeface="Trebuchet MS" pitchFamily="34" charset="0"/>
-              </a:rPr>
-              <a:t>is</a:t>
-            </a:r>
-            <a:r>
-              <a:rPr lang="he-IL" altLang="he-IL" sz="2000" dirty="0">
-                <a:latin typeface="Trebuchet MS" pitchFamily="34" charset="0"/>
-              </a:rPr>
-              <a:t> </a:t>
-            </a:r>
-            <a:r>
-              <a:rPr lang="he-IL" altLang="he-IL" sz="2000" dirty="0" err="1">
-                <a:latin typeface="Trebuchet MS" pitchFamily="34" charset="0"/>
-              </a:rPr>
-              <a:t>over</a:t>
-            </a:r>
-            <a:r>
-              <a:rPr lang="he-IL" altLang="he-IL" sz="2000" dirty="0">
-                <a:latin typeface="Trebuchet MS" pitchFamily="34" charset="0"/>
-              </a:rPr>
-              <a:t> 80%</a:t>
+              <a:t>do not live in Israel, the actual voter turnout is over 80%</a:t>
             </a:r>
             <a:r>
               <a:rPr lang="en-US" altLang="he-IL" sz="2000" dirty="0">
@@ -9251,7 +9045,19 @@
               <a:rPr lang="en-US" sz="2400" b="1" dirty="0">
                 <a:latin typeface="Trebuchet MS" pitchFamily="34" charset="0"/>
               </a:rPr>
-              <a:t>shallow) politics research.</a:t>
+              <a:t>shallow) </a:t>
+            </a:r>
+            <a:r>
+              <a:rPr lang="en-US" sz="2400" b="1" dirty="0" smtClean="0">
+                <a:latin typeface="Trebuchet MS" pitchFamily="34" charset="0"/>
+              </a:rPr>
+              <a:t>political </a:t>
+            </a:r>
+            <a:r>
+              <a:rPr lang="en-US" sz="2400" b="1" dirty="0">
+                <a:latin typeface="Trebuchet MS" pitchFamily="34" charset="0"/>
+              </a:rPr>
+              <a:t>research.</a:t>
             </a:r>
           </a:p>
           <a:p>
@@ -9786,14 +9592,14 @@
                 <a:latin typeface="Trebuchet MS" pitchFamily="34" charset="0"/>
                 <a:cs typeface="+mj-cs"/>
               </a:rPr>
-              <a:t>The </a:t>
+              <a:t>law briefings are presented </a:t>
             </a:r>
             <a:r>
               <a:rPr lang="en-US" dirty="0">
                 <a:latin typeface="Trebuchet MS" pitchFamily="34" charset="0"/>
                 <a:cs typeface="+mj-cs"/>
               </a:rPr>
-              <a:t>law briefing is presented to the user – the average user is LAZY, </a:t>
+              <a:t>to the user – the average user is LAZY, </a:t>
             </a:r>
             <a:r>
               <a:rPr lang="en-US" dirty="0" smtClean="0">
@@ -9928,7 +9734,19 @@
               <a:rPr lang="en-US" dirty="0">
                 <a:latin typeface="Trebuchet MS" pitchFamily="34" charset="0"/>
               </a:rPr>
-              <a:t>about new laws that was voted in the </a:t>
+              <a:t>about new laws that </a:t>
+            </a:r>
+            <a:r>
+              <a:rPr lang="en-US" dirty="0" smtClean="0">
+                <a:latin typeface="Trebuchet MS" pitchFamily="34" charset="0"/>
+              </a:rPr>
+              <a:t>were voted </a:t>
+            </a:r>
+            <a:r>
+              <a:rPr lang="en-US" dirty="0">
+                <a:latin typeface="Trebuchet MS" pitchFamily="34" charset="0"/>
+              </a:rPr>
+              <a:t>in the </a:t>
             </a:r>
             <a:r>
               <a:rPr lang="en-US" dirty="0" smtClean="0">
@@ -9991,7 +9809,13 @@
               <a:rPr lang="en-US" dirty="0" smtClean="0">
                 <a:latin typeface="Trebuchet MS" pitchFamily="34" charset="0"/>
               </a:rPr>
-              <a:t>will recommendations </a:t>
+              <a:t>will </a:t>
+            </a:r>
+            <a:r>
+              <a:rPr lang="en-US" dirty="0" smtClean="0">
+                <a:latin typeface="Trebuchet MS" pitchFamily="34" charset="0"/>
+              </a:rPr>
+              <a:t>get recommendations </a:t>
             </a:r>
             <a:r>
               <a:rPr lang="en-US" dirty="0">
@@ -12871,10 +12695,16 @@
               <a:t>Make </a:t>
             </a:r>
             <a:r>
+              <a:rPr lang="en-US" sz="2400" dirty="0" smtClean="0">
+                <a:latin typeface="Trebuchet MS" pitchFamily="34" charset="0"/>
+              </a:rPr>
+              <a:t>the average </a:t>
+            </a:r>
+            <a:r>
               <a:rPr lang="en-US" sz="2400" dirty="0">
                 <a:latin typeface="Trebuchet MS" pitchFamily="34" charset="0"/>
               </a:rPr>
-              <a:t>to average citizen more involved in the day-to-day </a:t>
+              <a:t>citizen more involved in the day-to-day </a:t>
             </a:r>
             <a:r>
               <a:rPr lang="en-US" sz="2400" dirty="0" smtClean="0">
@@ -12898,10 +12728,16 @@
               <a:t>Recommend </a:t>
             </a:r>
             <a:r>
+              <a:rPr lang="en-US" sz="2400" dirty="0" smtClean="0">
+                <a:latin typeface="Trebuchet MS" pitchFamily="34" charset="0"/>
+              </a:rPr>
+              <a:t>each </a:t>
+            </a:r>
+            <a:r>
               <a:rPr lang="en-US" sz="2400" dirty="0">
                 <a:latin typeface="Trebuchet MS" pitchFamily="34" charset="0"/>
               </a:rPr>
-              <a:t>for each user, which party he </a:t>
+              <a:t>user, which party he </a:t>
             </a:r>
             <a:r>
               <a:rPr lang="en-US" sz="2800" b="1" dirty="0">
@@ -12916,17 +12752,14 @@
               <a:t> </a:t>
             </a:r>
             <a:r>
-              <a:rPr lang="en-US" sz="2400" dirty="0">
-                <a:latin typeface="Trebuchet MS" pitchFamily="34" charset="0"/>
-              </a:rPr>
-              <a:t>support according the </a:t>
-            </a:r>
-            <a:r>
               <a:rPr lang="en-US" sz="2400" dirty="0" smtClean="0">
                 <a:latin typeface="Trebuchet MS" pitchFamily="34" charset="0"/>
               </a:rPr>
-              <a:t>statistics.</a:t>
-            </a:r>
+              <a:t>support.</a:t>
+            </a:r>
+            <a:endParaRPr lang="en-US" sz="2400" dirty="0" smtClean="0">
+              <a:latin typeface="Trebuchet MS" pitchFamily="34" charset="0"/>
+            </a:endParaRPr>
           </a:p>
           <a:p>
             <a:pPr algn="l" rtl="0"/>
@@ -13446,7 +13279,19 @@
               <a:rPr lang="en-US" dirty="0">
                 <a:latin typeface="Trebuchet MS" pitchFamily="34" charset="0"/>
               </a:rPr>
-              <a:t>: interest in the personal statistics and recommendations.</a:t>
+              <a:t>: interest in </a:t>
+            </a:r>
+            <a:r>
+              <a:rPr lang="en-US" dirty="0" smtClean="0">
+                <a:latin typeface="Trebuchet MS" pitchFamily="34" charset="0"/>
+              </a:rPr>
+              <a:t>personal </a:t>
+            </a:r>
+            <a:r>
+              <a:rPr lang="en-US" dirty="0">
+                <a:latin typeface="Trebuchet MS" pitchFamily="34" charset="0"/>
+              </a:rPr>
+              <a:t>statistics and recommendations.</a:t>
             </a:r>
           </a:p>
           <a:p>

</xml_diff>